<commit_message>
05 Forms and Validation
</commit_message>
<xml_diff>
--- a/00 Presentations/05 Forms and Validation.pptx
+++ b/00 Presentations/05 Forms and Validation.pptx
@@ -48,7 +48,7 @@
       <p:boldItalic r:id="rId31"/>
     </p:embeddedFont>
     <p:embeddedFont>
-      <p:font typeface="Lato" panose="020B0604020202020204" charset="0"/>
+      <p:font typeface="Lato" panose="020F0502020204030203" pitchFamily="34" charset="0"/>
       <p:regular r:id="rId32"/>
       <p:bold r:id="rId33"/>
       <p:italic r:id="rId34"/>
@@ -9499,7 +9499,7 @@
             </a:br>
             <a:r>
               <a:rPr lang="en-US" dirty="0"/>
-              <a:t>Forms and Data</a:t>
+              <a:t>Forms and Validation</a:t>
             </a:r>
           </a:p>
         </p:txBody>
@@ -9881,12 +9881,33 @@
             <p:ph type="subTitle" idx="1"/>
           </p:nvPr>
         </p:nvSpPr>
-        <p:spPr/>
+        <p:spPr>
+          <a:xfrm>
+            <a:off x="5950633" y="5233233"/>
+            <a:ext cx="6063175" cy="674700"/>
+          </a:xfrm>
+        </p:spPr>
         <p:txBody>
           <a:bodyPr/>
           <a:lstStyle/>
           <a:p>
-            <a:endParaRPr lang="bg-BG"/>
+            <a:r>
+              <a:rPr lang="en-US" dirty="0">
+                <a:hlinkClick r:id="rId2"/>
+              </a:rPr>
+              <a:t>https://www.tutorialsteacher.com/mvc</a:t>
+            </a:r>
+            <a:r>
+              <a:rPr lang="en-US">
+                <a:hlinkClick r:id="rId2"/>
+              </a:rPr>
+              <a:t>/html-helpers</a:t>
+            </a:r>
+            <a:r>
+              <a:rPr lang="en-US"/>
+              <a:t> </a:t>
+            </a:r>
+            <a:endParaRPr lang="bg-BG" dirty="0"/>
           </a:p>
         </p:txBody>
       </p:sp>
@@ -10760,7 +10781,7 @@
                 <a:effectLst/>
                 <a:latin typeface="Arial" panose="020B0604020202020204" pitchFamily="34" charset="0"/>
               </a:rPr>
-              <a:t>Entity Framework</a:t>
+              <a:t>File upload</a:t>
             </a:r>
           </a:p>
           <a:p>

</xml_diff>